<commit_message>
Reuploaded updated SaaS Churn Prediction PPT
</commit_message>
<xml_diff>
--- a/KhushbooMasih_SaaS_ChurnPrediction_CaseStudy_Aug2025.pptx
+++ b/KhushbooMasih_SaaS_ChurnPrediction_CaseStudy_Aug2025.pptx
@@ -3289,8 +3289,8 @@
         </p:nvSpPr>
         <p:spPr>
           <a:xfrm>
-            <a:off x="82193" y="5042749"/>
-            <a:ext cx="6339155" cy="1754326"/>
+            <a:off x="82193" y="4826675"/>
+            <a:ext cx="6339155" cy="2031325"/>
           </a:xfrm>
           <a:prstGeom prst="rect">
             <a:avLst/>
@@ -3400,6 +3400,44 @@
                 </a:hlinkClick>
               </a:rPr>
               <a:t>https://www.linkedin.com/in/khushboo-masih/</a:t>
+            </a:r>
+            <a:endParaRPr lang="en-IN" dirty="0">
+              <a:latin typeface="Calibri" panose="020F0502020204030204" pitchFamily="34" charset="0"/>
+              <a:ea typeface="Calibri" panose="020F0502020204030204" pitchFamily="34" charset="0"/>
+              <a:cs typeface="Calibri" panose="020F0502020204030204" pitchFamily="34" charset="0"/>
+            </a:endParaRPr>
+          </a:p>
+          <a:p>
+            <a:r>
+              <a:rPr lang="en-IN" dirty="0" err="1">
+                <a:latin typeface="Calibri" panose="020F0502020204030204" pitchFamily="34" charset="0"/>
+                <a:ea typeface="Calibri" panose="020F0502020204030204" pitchFamily="34" charset="0"/>
+                <a:cs typeface="Calibri" panose="020F0502020204030204" pitchFamily="34" charset="0"/>
+              </a:rPr>
+              <a:t>Github</a:t>
+            </a:r>
+            <a:r>
+              <a:rPr lang="en-IN" dirty="0">
+                <a:latin typeface="Calibri" panose="020F0502020204030204" pitchFamily="34" charset="0"/>
+                <a:ea typeface="Calibri" panose="020F0502020204030204" pitchFamily="34" charset="0"/>
+                <a:cs typeface="Calibri" panose="020F0502020204030204" pitchFamily="34" charset="0"/>
+              </a:rPr>
+              <a:t>: </a:t>
+            </a:r>
+            <a:r>
+              <a:rPr lang="en-IN" dirty="0">
+                <a:latin typeface="Calibri" panose="020F0502020204030204" pitchFamily="34" charset="0"/>
+                <a:ea typeface="Calibri" panose="020F0502020204030204" pitchFamily="34" charset="0"/>
+                <a:cs typeface="Calibri" panose="020F0502020204030204" pitchFamily="34" charset="0"/>
+                <a:hlinkClick r:id="rId4">
+                  <a:extLst>
+                    <a:ext uri="{A12FA001-AC4F-418D-AE19-62706E023703}">
+                      <ahyp:hlinkClr xmlns:ahyp="http://schemas.microsoft.com/office/drawing/2018/hyperlinkcolor" val="tx"/>
+                    </a:ext>
+                  </a:extLst>
+                </a:hlinkClick>
+              </a:rPr>
+              <a:t>https://github.com/Khush505/saas-churn-prediction</a:t>
             </a:r>
             <a:endParaRPr lang="en-IN" dirty="0">
               <a:latin typeface="Calibri" panose="020F0502020204030204" pitchFamily="34" charset="0"/>

</xml_diff>